<commit_message>
Made tiny change to ppt
</commit_message>
<xml_diff>
--- a/Lasso_Ridge Regression.pptx
+++ b/Lasso_Ridge Regression.pptx
@@ -37,7 +37,7 @@
   <p:notesSz cx="6858000" cy="9144000"/>
   <p:embeddedFontLst>
     <p:embeddedFont>
-      <p:font typeface="Roboto" panose="020B0604020202020204" pitchFamily="2" charset="0"/>
+      <p:font typeface="Roboto" panose="02000000000000000000" pitchFamily="2" charset="0"/>
       <p:regular r:id="rId27"/>
       <p:bold r:id="rId28"/>
       <p:italic r:id="rId29"/>
@@ -2706,7 +2706,7 @@
         </p:nvSpPr>
         <p:spPr>
           <a:xfrm>
-            <a:off x="381300" y="685800"/>
+            <a:off x="381000" y="685800"/>
             <a:ext cx="6096000" cy="3429000"/>
           </a:xfrm>
           <a:custGeom>
@@ -14282,8 +14282,8 @@
         </p:nvSpPr>
         <p:spPr>
           <a:xfrm>
-            <a:off x="5267400" y="534525"/>
-            <a:ext cx="2853600" cy="677100"/>
+            <a:off x="5230091" y="534525"/>
+            <a:ext cx="2890909" cy="677100"/>
           </a:xfrm>
           <a:prstGeom prst="rect">
             <a:avLst/>
@@ -14309,7 +14309,7 @@
               <a:buNone/>
             </a:pPr>
             <a:r>
-              <a:rPr lang="en" sz="3200">
+              <a:rPr lang="en" sz="3200" dirty="0">
                 <a:solidFill>
                   <a:schemeClr val="lt1"/>
                 </a:solidFill>
@@ -14320,7 +14320,7 @@
               </a:rPr>
               <a:t>Disadvantages</a:t>
             </a:r>
-            <a:endParaRPr sz="3200">
+            <a:endParaRPr sz="3200" dirty="0">
               <a:solidFill>
                 <a:schemeClr val="lt1"/>
               </a:solidFill>

</xml_diff>